<commit_message>
PowerPoint Slides for Presentation
Updated slides. Will be adding more information, and need to add the images of tables and graphs from the project. I will also type up a paper regarding the information that we will talk about during our meeting today..
</commit_message>
<xml_diff>
--- a/Bioinformatics Project Slides.pptx
+++ b/Bioinformatics Project Slides.pptx
@@ -258,7 +258,7 @@
             <a:fld id="{6E49F76C-6C2D-4824-9EDF-4D29F2CC6A02}" type="datetimeFigureOut">
               <a:rPr lang="en-US" smtClean="0"/>
               <a:pPr/>
-              <a:t>5/11/2017</a:t>
+              <a:t>5/14/2017</a:t>
             </a:fld>
             <a:endParaRPr lang="en-US"/>
           </a:p>
@@ -428,7 +428,7 @@
             <a:fld id="{6E49F76C-6C2D-4824-9EDF-4D29F2CC6A02}" type="datetimeFigureOut">
               <a:rPr lang="en-US" smtClean="0"/>
               <a:pPr/>
-              <a:t>5/11/2017</a:t>
+              <a:t>5/14/2017</a:t>
             </a:fld>
             <a:endParaRPr lang="en-US"/>
           </a:p>
@@ -608,7 +608,7 @@
             <a:fld id="{6E49F76C-6C2D-4824-9EDF-4D29F2CC6A02}" type="datetimeFigureOut">
               <a:rPr lang="en-US" smtClean="0"/>
               <a:pPr/>
-              <a:t>5/11/2017</a:t>
+              <a:t>5/14/2017</a:t>
             </a:fld>
             <a:endParaRPr lang="en-US"/>
           </a:p>
@@ -778,7 +778,7 @@
             <a:fld id="{6E49F76C-6C2D-4824-9EDF-4D29F2CC6A02}" type="datetimeFigureOut">
               <a:rPr lang="en-US" smtClean="0"/>
               <a:pPr/>
-              <a:t>5/11/2017</a:t>
+              <a:t>5/14/2017</a:t>
             </a:fld>
             <a:endParaRPr lang="en-US"/>
           </a:p>
@@ -1025,7 +1025,7 @@
             <a:fld id="{6E49F76C-6C2D-4824-9EDF-4D29F2CC6A02}" type="datetimeFigureOut">
               <a:rPr lang="en-US" smtClean="0"/>
               <a:pPr/>
-              <a:t>5/11/2017</a:t>
+              <a:t>5/14/2017</a:t>
             </a:fld>
             <a:endParaRPr lang="en-US"/>
           </a:p>
@@ -1256,7 +1256,7 @@
             <a:fld id="{6E49F76C-6C2D-4824-9EDF-4D29F2CC6A02}" type="datetimeFigureOut">
               <a:rPr lang="en-US" smtClean="0"/>
               <a:pPr/>
-              <a:t>5/11/2017</a:t>
+              <a:t>5/14/2017</a:t>
             </a:fld>
             <a:endParaRPr lang="en-US"/>
           </a:p>
@@ -1622,7 +1622,7 @@
             <a:fld id="{6E49F76C-6C2D-4824-9EDF-4D29F2CC6A02}" type="datetimeFigureOut">
               <a:rPr lang="en-US" smtClean="0"/>
               <a:pPr/>
-              <a:t>5/11/2017</a:t>
+              <a:t>5/14/2017</a:t>
             </a:fld>
             <a:endParaRPr lang="en-US"/>
           </a:p>
@@ -1741,7 +1741,7 @@
             <a:fld id="{6E49F76C-6C2D-4824-9EDF-4D29F2CC6A02}" type="datetimeFigureOut">
               <a:rPr lang="en-US" smtClean="0"/>
               <a:pPr/>
-              <a:t>5/11/2017</a:t>
+              <a:t>5/14/2017</a:t>
             </a:fld>
             <a:endParaRPr lang="en-US"/>
           </a:p>
@@ -1838,7 +1838,7 @@
             <a:fld id="{6E49F76C-6C2D-4824-9EDF-4D29F2CC6A02}" type="datetimeFigureOut">
               <a:rPr lang="en-US" smtClean="0"/>
               <a:pPr/>
-              <a:t>5/11/2017</a:t>
+              <a:t>5/14/2017</a:t>
             </a:fld>
             <a:endParaRPr lang="en-US"/>
           </a:p>
@@ -2115,7 +2115,7 @@
             <a:fld id="{6E49F76C-6C2D-4824-9EDF-4D29F2CC6A02}" type="datetimeFigureOut">
               <a:rPr lang="en-US" smtClean="0"/>
               <a:pPr/>
-              <a:t>5/11/2017</a:t>
+              <a:t>5/14/2017</a:t>
             </a:fld>
             <a:endParaRPr lang="en-US"/>
           </a:p>
@@ -2369,7 +2369,7 @@
             <a:fld id="{6E49F76C-6C2D-4824-9EDF-4D29F2CC6A02}" type="datetimeFigureOut">
               <a:rPr lang="en-US" smtClean="0"/>
               <a:pPr/>
-              <a:t>5/11/2017</a:t>
+              <a:t>5/14/2017</a:t>
             </a:fld>
             <a:endParaRPr lang="en-US"/>
           </a:p>
@@ -2582,7 +2582,7 @@
             <a:fld id="{6E49F76C-6C2D-4824-9EDF-4D29F2CC6A02}" type="datetimeFigureOut">
               <a:rPr lang="en-US" smtClean="0"/>
               <a:pPr/>
-              <a:t>5/11/2017</a:t>
+              <a:t>5/14/2017</a:t>
             </a:fld>
             <a:endParaRPr lang="en-US"/>
           </a:p>
@@ -3721,13 +3721,35 @@
           <a:lstStyle/>
           <a:p>
             <a:r>
-              <a:rPr lang="en-US" sz="2400" dirty="0" smtClean="0"/>
+              <a:rPr lang="en-US" sz="2400" dirty="0" smtClean="0">
+                <a:hlinkClick r:id="rId2"/>
+              </a:rPr>
               <a:t>http://</a:t>
             </a:r>
             <a:r>
-              <a:rPr lang="en-US" sz="2400" dirty="0" smtClean="0"/>
+              <a:rPr lang="en-US" sz="2400" dirty="0" smtClean="0">
+                <a:hlinkClick r:id="rId2"/>
+              </a:rPr>
               <a:t>www.kyoto-u.ac.jp/en/research/research_results/2015/160205_1.html</a:t>
             </a:r>
+            <a:endParaRPr lang="en-US" sz="2400" dirty="0" smtClean="0"/>
+          </a:p>
+          <a:p>
+            <a:r>
+              <a:rPr lang="en-US" sz="2400" dirty="0" smtClean="0">
+                <a:hlinkClick r:id="rId3"/>
+              </a:rPr>
+              <a:t>http://</a:t>
+            </a:r>
+            <a:r>
+              <a:rPr lang="en-US" sz="2400" dirty="0" smtClean="0">
+                <a:hlinkClick r:id="rId3"/>
+              </a:rPr>
+              <a:t>onlinelibrary.wiley.com/doi/10.1002/biot.201600145/full</a:t>
+            </a:r>
+            <a:endParaRPr lang="en-US" sz="2400" dirty="0" smtClean="0"/>
+          </a:p>
+          <a:p>
             <a:endParaRPr lang="en-US" sz="2400" dirty="0"/>
           </a:p>
         </p:txBody>
@@ -3826,7 +3848,11 @@
             </a:pPr>
             <a:r>
               <a:rPr lang="en-US" dirty="0" smtClean="0"/>
-              <a:t>- EX:</a:t>
+              <a:t>- EX: (Example </a:t>
+            </a:r>
+            <a:r>
+              <a:rPr lang="en-US" smtClean="0"/>
+              <a:t>of truth table)</a:t>
             </a:r>
             <a:endParaRPr lang="en-US" dirty="0"/>
           </a:p>
@@ -4019,11 +4045,7 @@
             <a:pPr lvl="1"/>
             <a:r>
               <a:rPr lang="en-US" dirty="0" smtClean="0"/>
-              <a:t>Creates medicines such as insulin, opiates, and vaccines</a:t>
-            </a:r>
-            <a:r>
-              <a:rPr lang="en-US" dirty="0" smtClean="0"/>
-              <a:t>.</a:t>
+              <a:t>Creates medicines such as insulin, opiates, and vaccines.</a:t>
             </a:r>
           </a:p>
           <a:p>
@@ -4124,13 +4146,8 @@
           <a:p>
             <a:r>
               <a:rPr lang="en-US" dirty="0" smtClean="0"/>
-              <a:t>Discovered by Bioengineers at Kyoto University</a:t>
-            </a:r>
-            <a:r>
-              <a:rPr lang="en-US" dirty="0" smtClean="0"/>
-              <a:t>:</a:t>
-            </a:r>
-            <a:endParaRPr lang="en-US" dirty="0" smtClean="0"/>
+              <a:t>Discovered by Bioengineers at Kyoto University:</a:t>
+            </a:r>
           </a:p>
           <a:p>
             <a:pPr lvl="1"/>
@@ -4148,15 +4165,7 @@
           <a:p>
             <a:r>
               <a:rPr lang="en-US" dirty="0" smtClean="0"/>
-              <a:t>Enzymes from Opium poppies and genes from other Bacteria Spliced into E. </a:t>
-            </a:r>
-            <a:r>
-              <a:rPr lang="en-US" dirty="0" smtClean="0"/>
-              <a:t>c</a:t>
-            </a:r>
-            <a:r>
-              <a:rPr lang="en-US" dirty="0" smtClean="0"/>
-              <a:t>oli:</a:t>
+              <a:t>Enzymes from Opium poppies and genes from other Bacteria Spliced into E. coli:</a:t>
             </a:r>
           </a:p>
           <a:p>
@@ -4251,6 +4260,32 @@
           </a:p>
         </p:txBody>
       </p:sp>
+      <p:pic>
+        <p:nvPicPr>
+          <p:cNvPr id="13314" name="Picture 2" descr="Figure 3. "/>
+          <p:cNvPicPr>
+            <a:picLocks noChangeAspect="1" noChangeArrowheads="1"/>
+          </p:cNvPicPr>
+          <p:nvPr/>
+        </p:nvPicPr>
+        <p:blipFill>
+          <a:blip r:embed="rId2" cstate="print"/>
+          <a:srcRect/>
+          <a:stretch>
+            <a:fillRect/>
+          </a:stretch>
+        </p:blipFill>
+        <p:spPr bwMode="auto">
+          <a:xfrm>
+            <a:off x="5819775" y="0"/>
+            <a:ext cx="6372225" cy="6477000"/>
+          </a:xfrm>
+          <a:prstGeom prst="rect">
+            <a:avLst/>
+          </a:prstGeom>
+          <a:noFill/>
+        </p:spPr>
+      </p:pic>
     </p:spTree>
     <p:extLst>
       <p:ext uri="{BB962C8B-B14F-4D97-AF65-F5344CB8AC3E}">
@@ -4261,6 +4296,13 @@
   <p:clrMapOvr>
     <a:masterClrMapping/>
   </p:clrMapOvr>
+  <p:timing>
+    <p:tnLst>
+      <p:par>
+        <p:cTn id="1" dur="indefinite" restart="never" nodeType="tmRoot"/>
+      </p:par>
+    </p:tnLst>
+  </p:timing>
 </p:sld>
 </file>
 
@@ -4340,6 +4382,13 @@
   <p:clrMapOvr>
     <a:masterClrMapping/>
   </p:clrMapOvr>
+  <p:timing>
+    <p:tnLst>
+      <p:par>
+        <p:cTn id="1" dur="indefinite" restart="never" nodeType="tmRoot"/>
+      </p:par>
+    </p:tnLst>
+  </p:timing>
 </p:sld>
 </file>
 
@@ -4471,6 +4520,13 @@
   <p:clrMapOvr>
     <a:masterClrMapping/>
   </p:clrMapOvr>
+  <p:timing>
+    <p:tnLst>
+      <p:par>
+        <p:cTn id="1" dur="indefinite" restart="never" nodeType="tmRoot"/>
+      </p:par>
+    </p:tnLst>
+  </p:timing>
 </p:sld>
 </file>
 

</xml_diff>